<commit_message>
added code for Customer segment prediction
</commit_message>
<xml_diff>
--- a/Hands-on Machine Learning.pptx
+++ b/Hands-on Machine Learning.pptx
@@ -3833,8 +3833,20 @@
           </a:p>
           <a:p>
             <a:r>
+              <a:rPr lang="en-US"/>
+              <a:t>No Mathematic</a:t>
+            </a:r>
+            <a:r>
               <a:rPr lang="en-US" dirty="0"/>
-              <a:t>No Mathematic involved</a:t>
+              <a:t>s</a:t>
+            </a:r>
+            <a:r>
+              <a:rPr lang="en-US"/>
+              <a:t> </a:t>
+            </a:r>
+            <a:r>
+              <a:rPr lang="en-US" dirty="0"/>
+              <a:t>involved</a:t>
             </a:r>
             <a:endParaRPr lang="en-IN" dirty="0"/>
           </a:p>

</xml_diff>